<commit_message>
Updated UML diagram in Developer Guide
</commit_message>
<xml_diff>
--- a/doc/Diagrams.pptx
+++ b/doc/Diagrams.pptx
@@ -164,10 +164,9 @@
           <a:lstStyle/>
           <a:p>
             <a:r>
-              <a:rPr lang="en-US" smtClean="0"/>
+              <a:rPr lang="en-US"/>
               <a:t>Click to edit Master title style</a:t>
             </a:r>
-            <a:endParaRPr lang="en-US"/>
           </a:p>
         </p:txBody>
       </p:sp>
@@ -283,10 +282,9 @@
           </a:lstStyle>
           <a:p>
             <a:r>
-              <a:rPr lang="en-US" smtClean="0"/>
+              <a:rPr lang="en-US"/>
               <a:t>Click to edit Master subtitle style</a:t>
             </a:r>
-            <a:endParaRPr lang="en-US"/>
           </a:p>
         </p:txBody>
       </p:sp>
@@ -307,7 +305,7 @@
           <a:p>
             <a:fld id="{78C97017-6FC3-485B-9764-EAC9E56C1D49}" type="datetimeFigureOut">
               <a:rPr lang="en-US" smtClean="0"/>
-              <a:t>8/31/2017</a:t>
+              <a:t>2/7/2018</a:t>
             </a:fld>
             <a:endParaRPr lang="en-US"/>
           </a:p>
@@ -401,10 +399,9 @@
           <a:lstStyle/>
           <a:p>
             <a:r>
-              <a:rPr lang="en-US" smtClean="0"/>
+              <a:rPr lang="en-US"/>
               <a:t>Click to edit Master title style</a:t>
             </a:r>
-            <a:endParaRPr lang="en-US"/>
           </a:p>
         </p:txBody>
       </p:sp>
@@ -425,38 +422,37 @@
           <a:p>
             <a:pPr lvl="0"/>
             <a:r>
-              <a:rPr lang="en-US" smtClean="0"/>
+              <a:rPr lang="en-US"/>
               <a:t>Click to edit Master text styles</a:t>
             </a:r>
           </a:p>
           <a:p>
             <a:pPr lvl="1"/>
             <a:r>
-              <a:rPr lang="en-US" smtClean="0"/>
+              <a:rPr lang="en-US"/>
               <a:t>Second level</a:t>
             </a:r>
           </a:p>
           <a:p>
             <a:pPr lvl="2"/>
             <a:r>
-              <a:rPr lang="en-US" smtClean="0"/>
+              <a:rPr lang="en-US"/>
               <a:t>Third level</a:t>
             </a:r>
           </a:p>
           <a:p>
             <a:pPr lvl="3"/>
             <a:r>
-              <a:rPr lang="en-US" smtClean="0"/>
+              <a:rPr lang="en-US"/>
               <a:t>Fourth level</a:t>
             </a:r>
           </a:p>
           <a:p>
             <a:pPr lvl="4"/>
             <a:r>
-              <a:rPr lang="en-US" smtClean="0"/>
+              <a:rPr lang="en-US"/>
               <a:t>Fifth level</a:t>
             </a:r>
-            <a:endParaRPr lang="en-US"/>
           </a:p>
         </p:txBody>
       </p:sp>
@@ -477,7 +473,7 @@
           <a:p>
             <a:fld id="{78C97017-6FC3-485B-9764-EAC9E56C1D49}" type="datetimeFigureOut">
               <a:rPr lang="en-US" smtClean="0"/>
-              <a:t>8/31/2017</a:t>
+              <a:t>2/7/2018</a:t>
             </a:fld>
             <a:endParaRPr lang="en-US"/>
           </a:p>
@@ -576,10 +572,9 @@
           <a:lstStyle/>
           <a:p>
             <a:r>
-              <a:rPr lang="en-US" smtClean="0"/>
+              <a:rPr lang="en-US"/>
               <a:t>Click to edit Master title style</a:t>
             </a:r>
-            <a:endParaRPr lang="en-US"/>
           </a:p>
         </p:txBody>
       </p:sp>
@@ -605,38 +600,37 @@
           <a:p>
             <a:pPr lvl="0"/>
             <a:r>
-              <a:rPr lang="en-US" smtClean="0"/>
+              <a:rPr lang="en-US"/>
               <a:t>Click to edit Master text styles</a:t>
             </a:r>
           </a:p>
           <a:p>
             <a:pPr lvl="1"/>
             <a:r>
-              <a:rPr lang="en-US" smtClean="0"/>
+              <a:rPr lang="en-US"/>
               <a:t>Second level</a:t>
             </a:r>
           </a:p>
           <a:p>
             <a:pPr lvl="2"/>
             <a:r>
-              <a:rPr lang="en-US" smtClean="0"/>
+              <a:rPr lang="en-US"/>
               <a:t>Third level</a:t>
             </a:r>
           </a:p>
           <a:p>
             <a:pPr lvl="3"/>
             <a:r>
-              <a:rPr lang="en-US" smtClean="0"/>
+              <a:rPr lang="en-US"/>
               <a:t>Fourth level</a:t>
             </a:r>
           </a:p>
           <a:p>
             <a:pPr lvl="4"/>
             <a:r>
-              <a:rPr lang="en-US" smtClean="0"/>
+              <a:rPr lang="en-US"/>
               <a:t>Fifth level</a:t>
             </a:r>
-            <a:endParaRPr lang="en-US"/>
           </a:p>
         </p:txBody>
       </p:sp>
@@ -657,7 +651,7 @@
           <a:p>
             <a:fld id="{78C97017-6FC3-485B-9764-EAC9E56C1D49}" type="datetimeFigureOut">
               <a:rPr lang="en-US" smtClean="0"/>
-              <a:t>8/31/2017</a:t>
+              <a:t>2/7/2018</a:t>
             </a:fld>
             <a:endParaRPr lang="en-US"/>
           </a:p>
@@ -751,10 +745,9 @@
           <a:lstStyle/>
           <a:p>
             <a:r>
-              <a:rPr lang="en-US" smtClean="0"/>
+              <a:rPr lang="en-US"/>
               <a:t>Click to edit Master title style</a:t>
             </a:r>
-            <a:endParaRPr lang="en-US"/>
           </a:p>
         </p:txBody>
       </p:sp>
@@ -775,38 +768,37 @@
           <a:p>
             <a:pPr lvl="0"/>
             <a:r>
-              <a:rPr lang="en-US" smtClean="0"/>
+              <a:rPr lang="en-US"/>
               <a:t>Click to edit Master text styles</a:t>
             </a:r>
           </a:p>
           <a:p>
             <a:pPr lvl="1"/>
             <a:r>
-              <a:rPr lang="en-US" smtClean="0"/>
+              <a:rPr lang="en-US"/>
               <a:t>Second level</a:t>
             </a:r>
           </a:p>
           <a:p>
             <a:pPr lvl="2"/>
             <a:r>
-              <a:rPr lang="en-US" smtClean="0"/>
+              <a:rPr lang="en-US"/>
               <a:t>Third level</a:t>
             </a:r>
           </a:p>
           <a:p>
             <a:pPr lvl="3"/>
             <a:r>
-              <a:rPr lang="en-US" smtClean="0"/>
+              <a:rPr lang="en-US"/>
               <a:t>Fourth level</a:t>
             </a:r>
           </a:p>
           <a:p>
             <a:pPr lvl="4"/>
             <a:r>
-              <a:rPr lang="en-US" smtClean="0"/>
+              <a:rPr lang="en-US"/>
               <a:t>Fifth level</a:t>
             </a:r>
-            <a:endParaRPr lang="en-US"/>
           </a:p>
         </p:txBody>
       </p:sp>
@@ -827,7 +819,7 @@
           <a:p>
             <a:fld id="{78C97017-6FC3-485B-9764-EAC9E56C1D49}" type="datetimeFigureOut">
               <a:rPr lang="en-US" smtClean="0"/>
-              <a:t>8/31/2017</a:t>
+              <a:t>2/7/2018</a:t>
             </a:fld>
             <a:endParaRPr lang="en-US"/>
           </a:p>
@@ -930,10 +922,9 @@
           </a:lstStyle>
           <a:p>
             <a:r>
-              <a:rPr lang="en-US" smtClean="0"/>
+              <a:rPr lang="en-US"/>
               <a:t>Click to edit Master title style</a:t>
             </a:r>
-            <a:endParaRPr lang="en-US"/>
           </a:p>
         </p:txBody>
       </p:sp>
@@ -1050,7 +1041,7 @@
           <a:p>
             <a:pPr lvl="0"/>
             <a:r>
-              <a:rPr lang="en-US" smtClean="0"/>
+              <a:rPr lang="en-US"/>
               <a:t>Click to edit Master text styles</a:t>
             </a:r>
           </a:p>
@@ -1073,7 +1064,7 @@
           <a:p>
             <a:fld id="{78C97017-6FC3-485B-9764-EAC9E56C1D49}" type="datetimeFigureOut">
               <a:rPr lang="en-US" smtClean="0"/>
-              <a:t>8/31/2017</a:t>
+              <a:t>2/7/2018</a:t>
             </a:fld>
             <a:endParaRPr lang="en-US"/>
           </a:p>
@@ -1167,10 +1158,9 @@
           <a:lstStyle/>
           <a:p>
             <a:r>
-              <a:rPr lang="en-US" smtClean="0"/>
+              <a:rPr lang="en-US"/>
               <a:t>Click to edit Master title style</a:t>
             </a:r>
-            <a:endParaRPr lang="en-US"/>
           </a:p>
         </p:txBody>
       </p:sp>
@@ -1224,38 +1214,37 @@
           <a:p>
             <a:pPr lvl="0"/>
             <a:r>
-              <a:rPr lang="en-US" smtClean="0"/>
+              <a:rPr lang="en-US"/>
               <a:t>Click to edit Master text styles</a:t>
             </a:r>
           </a:p>
           <a:p>
             <a:pPr lvl="1"/>
             <a:r>
-              <a:rPr lang="en-US" smtClean="0"/>
+              <a:rPr lang="en-US"/>
               <a:t>Second level</a:t>
             </a:r>
           </a:p>
           <a:p>
             <a:pPr lvl="2"/>
             <a:r>
-              <a:rPr lang="en-US" smtClean="0"/>
+              <a:rPr lang="en-US"/>
               <a:t>Third level</a:t>
             </a:r>
           </a:p>
           <a:p>
             <a:pPr lvl="3"/>
             <a:r>
-              <a:rPr lang="en-US" smtClean="0"/>
+              <a:rPr lang="en-US"/>
               <a:t>Fourth level</a:t>
             </a:r>
           </a:p>
           <a:p>
             <a:pPr lvl="4"/>
             <a:r>
-              <a:rPr lang="en-US" smtClean="0"/>
+              <a:rPr lang="en-US"/>
               <a:t>Fifth level</a:t>
             </a:r>
-            <a:endParaRPr lang="en-US"/>
           </a:p>
         </p:txBody>
       </p:sp>
@@ -1309,38 +1298,37 @@
           <a:p>
             <a:pPr lvl="0"/>
             <a:r>
-              <a:rPr lang="en-US" smtClean="0"/>
+              <a:rPr lang="en-US"/>
               <a:t>Click to edit Master text styles</a:t>
             </a:r>
           </a:p>
           <a:p>
             <a:pPr lvl="1"/>
             <a:r>
-              <a:rPr lang="en-US" smtClean="0"/>
+              <a:rPr lang="en-US"/>
               <a:t>Second level</a:t>
             </a:r>
           </a:p>
           <a:p>
             <a:pPr lvl="2"/>
             <a:r>
-              <a:rPr lang="en-US" smtClean="0"/>
+              <a:rPr lang="en-US"/>
               <a:t>Third level</a:t>
             </a:r>
           </a:p>
           <a:p>
             <a:pPr lvl="3"/>
             <a:r>
-              <a:rPr lang="en-US" smtClean="0"/>
+              <a:rPr lang="en-US"/>
               <a:t>Fourth level</a:t>
             </a:r>
           </a:p>
           <a:p>
             <a:pPr lvl="4"/>
             <a:r>
-              <a:rPr lang="en-US" smtClean="0"/>
+              <a:rPr lang="en-US"/>
               <a:t>Fifth level</a:t>
             </a:r>
-            <a:endParaRPr lang="en-US"/>
           </a:p>
         </p:txBody>
       </p:sp>
@@ -1361,7 +1349,7 @@
           <a:p>
             <a:fld id="{78C97017-6FC3-485B-9764-EAC9E56C1D49}" type="datetimeFigureOut">
               <a:rPr lang="en-US" smtClean="0"/>
-              <a:t>8/31/2017</a:t>
+              <a:t>2/7/2018</a:t>
             </a:fld>
             <a:endParaRPr lang="en-US"/>
           </a:p>
@@ -1459,10 +1447,9 @@
           </a:lstStyle>
           <a:p>
             <a:r>
-              <a:rPr lang="en-US" smtClean="0"/>
+              <a:rPr lang="en-US"/>
               <a:t>Click to edit Master title style</a:t>
             </a:r>
-            <a:endParaRPr lang="en-US"/>
           </a:p>
         </p:txBody>
       </p:sp>
@@ -1525,7 +1512,7 @@
           <a:p>
             <a:pPr lvl="0"/>
             <a:r>
-              <a:rPr lang="en-US" smtClean="0"/>
+              <a:rPr lang="en-US"/>
               <a:t>Click to edit Master text styles</a:t>
             </a:r>
           </a:p>
@@ -1581,38 +1568,37 @@
           <a:p>
             <a:pPr lvl="0"/>
             <a:r>
-              <a:rPr lang="en-US" smtClean="0"/>
+              <a:rPr lang="en-US"/>
               <a:t>Click to edit Master text styles</a:t>
             </a:r>
           </a:p>
           <a:p>
             <a:pPr lvl="1"/>
             <a:r>
-              <a:rPr lang="en-US" smtClean="0"/>
+              <a:rPr lang="en-US"/>
               <a:t>Second level</a:t>
             </a:r>
           </a:p>
           <a:p>
             <a:pPr lvl="2"/>
             <a:r>
-              <a:rPr lang="en-US" smtClean="0"/>
+              <a:rPr lang="en-US"/>
               <a:t>Third level</a:t>
             </a:r>
           </a:p>
           <a:p>
             <a:pPr lvl="3"/>
             <a:r>
-              <a:rPr lang="en-US" smtClean="0"/>
+              <a:rPr lang="en-US"/>
               <a:t>Fourth level</a:t>
             </a:r>
           </a:p>
           <a:p>
             <a:pPr lvl="4"/>
             <a:r>
-              <a:rPr lang="en-US" smtClean="0"/>
+              <a:rPr lang="en-US"/>
               <a:t>Fifth level</a:t>
             </a:r>
-            <a:endParaRPr lang="en-US"/>
           </a:p>
         </p:txBody>
       </p:sp>
@@ -1675,7 +1661,7 @@
           <a:p>
             <a:pPr lvl="0"/>
             <a:r>
-              <a:rPr lang="en-US" smtClean="0"/>
+              <a:rPr lang="en-US"/>
               <a:t>Click to edit Master text styles</a:t>
             </a:r>
           </a:p>
@@ -1731,38 +1717,37 @@
           <a:p>
             <a:pPr lvl="0"/>
             <a:r>
-              <a:rPr lang="en-US" smtClean="0"/>
+              <a:rPr lang="en-US"/>
               <a:t>Click to edit Master text styles</a:t>
             </a:r>
           </a:p>
           <a:p>
             <a:pPr lvl="1"/>
             <a:r>
-              <a:rPr lang="en-US" smtClean="0"/>
+              <a:rPr lang="en-US"/>
               <a:t>Second level</a:t>
             </a:r>
           </a:p>
           <a:p>
             <a:pPr lvl="2"/>
             <a:r>
-              <a:rPr lang="en-US" smtClean="0"/>
+              <a:rPr lang="en-US"/>
               <a:t>Third level</a:t>
             </a:r>
           </a:p>
           <a:p>
             <a:pPr lvl="3"/>
             <a:r>
-              <a:rPr lang="en-US" smtClean="0"/>
+              <a:rPr lang="en-US"/>
               <a:t>Fourth level</a:t>
             </a:r>
           </a:p>
           <a:p>
             <a:pPr lvl="4"/>
             <a:r>
-              <a:rPr lang="en-US" smtClean="0"/>
+              <a:rPr lang="en-US"/>
               <a:t>Fifth level</a:t>
             </a:r>
-            <a:endParaRPr lang="en-US"/>
           </a:p>
         </p:txBody>
       </p:sp>
@@ -1783,7 +1768,7 @@
           <a:p>
             <a:fld id="{78C97017-6FC3-485B-9764-EAC9E56C1D49}" type="datetimeFigureOut">
               <a:rPr lang="en-US" smtClean="0"/>
-              <a:t>8/31/2017</a:t>
+              <a:t>2/7/2018</a:t>
             </a:fld>
             <a:endParaRPr lang="en-US"/>
           </a:p>
@@ -1877,10 +1862,9 @@
           <a:lstStyle/>
           <a:p>
             <a:r>
-              <a:rPr lang="en-US" smtClean="0"/>
+              <a:rPr lang="en-US"/>
               <a:t>Click to edit Master title style</a:t>
             </a:r>
-            <a:endParaRPr lang="en-US"/>
           </a:p>
         </p:txBody>
       </p:sp>
@@ -1901,7 +1885,7 @@
           <a:p>
             <a:fld id="{78C97017-6FC3-485B-9764-EAC9E56C1D49}" type="datetimeFigureOut">
               <a:rPr lang="en-US" smtClean="0"/>
-              <a:t>8/31/2017</a:t>
+              <a:t>2/7/2018</a:t>
             </a:fld>
             <a:endParaRPr lang="en-US"/>
           </a:p>
@@ -1996,7 +1980,7 @@
           <a:p>
             <a:fld id="{78C97017-6FC3-485B-9764-EAC9E56C1D49}" type="datetimeFigureOut">
               <a:rPr lang="en-US" smtClean="0"/>
-              <a:t>8/31/2017</a:t>
+              <a:t>2/7/2018</a:t>
             </a:fld>
             <a:endParaRPr lang="en-US"/>
           </a:p>
@@ -2099,10 +2083,9 @@
           </a:lstStyle>
           <a:p>
             <a:r>
-              <a:rPr lang="en-US" smtClean="0"/>
+              <a:rPr lang="en-US"/>
               <a:t>Click to edit Master title style</a:t>
             </a:r>
-            <a:endParaRPr lang="en-US"/>
           </a:p>
         </p:txBody>
       </p:sp>
@@ -2156,38 +2139,37 @@
           <a:p>
             <a:pPr lvl="0"/>
             <a:r>
-              <a:rPr lang="en-US" smtClean="0"/>
+              <a:rPr lang="en-US"/>
               <a:t>Click to edit Master text styles</a:t>
             </a:r>
           </a:p>
           <a:p>
             <a:pPr lvl="1"/>
             <a:r>
-              <a:rPr lang="en-US" smtClean="0"/>
+              <a:rPr lang="en-US"/>
               <a:t>Second level</a:t>
             </a:r>
           </a:p>
           <a:p>
             <a:pPr lvl="2"/>
             <a:r>
-              <a:rPr lang="en-US" smtClean="0"/>
+              <a:rPr lang="en-US"/>
               <a:t>Third level</a:t>
             </a:r>
           </a:p>
           <a:p>
             <a:pPr lvl="3"/>
             <a:r>
-              <a:rPr lang="en-US" smtClean="0"/>
+              <a:rPr lang="en-US"/>
               <a:t>Fourth level</a:t>
             </a:r>
           </a:p>
           <a:p>
             <a:pPr lvl="4"/>
             <a:r>
-              <a:rPr lang="en-US" smtClean="0"/>
+              <a:rPr lang="en-US"/>
               <a:t>Fifth level</a:t>
             </a:r>
-            <a:endParaRPr lang="en-US"/>
           </a:p>
         </p:txBody>
       </p:sp>
@@ -2250,7 +2232,7 @@
           <a:p>
             <a:pPr lvl="0"/>
             <a:r>
-              <a:rPr lang="en-US" smtClean="0"/>
+              <a:rPr lang="en-US"/>
               <a:t>Click to edit Master text styles</a:t>
             </a:r>
           </a:p>
@@ -2273,7 +2255,7 @@
           <a:p>
             <a:fld id="{78C97017-6FC3-485B-9764-EAC9E56C1D49}" type="datetimeFigureOut">
               <a:rPr lang="en-US" smtClean="0"/>
-              <a:t>8/31/2017</a:t>
+              <a:t>2/7/2018</a:t>
             </a:fld>
             <a:endParaRPr lang="en-US"/>
           </a:p>
@@ -2376,10 +2358,9 @@
           </a:lstStyle>
           <a:p>
             <a:r>
-              <a:rPr lang="en-US" smtClean="0"/>
+              <a:rPr lang="en-US"/>
               <a:t>Click to edit Master title style</a:t>
             </a:r>
-            <a:endParaRPr lang="en-US"/>
           </a:p>
         </p:txBody>
       </p:sp>
@@ -2503,7 +2484,7 @@
           <a:p>
             <a:pPr lvl="0"/>
             <a:r>
-              <a:rPr lang="en-US" smtClean="0"/>
+              <a:rPr lang="en-US"/>
               <a:t>Click to edit Master text styles</a:t>
             </a:r>
           </a:p>
@@ -2526,7 +2507,7 @@
           <a:p>
             <a:fld id="{78C97017-6FC3-485B-9764-EAC9E56C1D49}" type="datetimeFigureOut">
               <a:rPr lang="en-US" smtClean="0"/>
-              <a:t>8/31/2017</a:t>
+              <a:t>2/7/2018</a:t>
             </a:fld>
             <a:endParaRPr lang="en-US"/>
           </a:p>
@@ -2635,10 +2616,9 @@
           <a:lstStyle/>
           <a:p>
             <a:r>
-              <a:rPr lang="en-US" smtClean="0"/>
+              <a:rPr lang="en-US"/>
               <a:t>Click to edit Master title style</a:t>
             </a:r>
-            <a:endParaRPr lang="en-US"/>
           </a:p>
         </p:txBody>
       </p:sp>
@@ -2669,38 +2649,37 @@
           <a:p>
             <a:pPr lvl="0"/>
             <a:r>
-              <a:rPr lang="en-US" smtClean="0"/>
+              <a:rPr lang="en-US"/>
               <a:t>Click to edit Master text styles</a:t>
             </a:r>
           </a:p>
           <a:p>
             <a:pPr lvl="1"/>
             <a:r>
-              <a:rPr lang="en-US" smtClean="0"/>
+              <a:rPr lang="en-US"/>
               <a:t>Second level</a:t>
             </a:r>
           </a:p>
           <a:p>
             <a:pPr lvl="2"/>
             <a:r>
-              <a:rPr lang="en-US" smtClean="0"/>
+              <a:rPr lang="en-US"/>
               <a:t>Third level</a:t>
             </a:r>
           </a:p>
           <a:p>
             <a:pPr lvl="3"/>
             <a:r>
-              <a:rPr lang="en-US" smtClean="0"/>
+              <a:rPr lang="en-US"/>
               <a:t>Fourth level</a:t>
             </a:r>
           </a:p>
           <a:p>
             <a:pPr lvl="4"/>
             <a:r>
-              <a:rPr lang="en-US" smtClean="0"/>
+              <a:rPr lang="en-US"/>
               <a:t>Fifth level</a:t>
             </a:r>
-            <a:endParaRPr lang="en-US"/>
           </a:p>
         </p:txBody>
       </p:sp>
@@ -2739,7 +2718,7 @@
           <a:p>
             <a:fld id="{78C97017-6FC3-485B-9764-EAC9E56C1D49}" type="datetimeFigureOut">
               <a:rPr lang="en-US" smtClean="0"/>
-              <a:t>8/31/2017</a:t>
+              <a:t>2/7/2018</a:t>
             </a:fld>
             <a:endParaRPr lang="en-US"/>
           </a:p>
@@ -3130,14 +3109,13 @@
           <a:lstStyle/>
           <a:p>
             <a:r>
-              <a:rPr lang="en-US" dirty="0" err="1" smtClean="0"/>
+              <a:rPr lang="en-US" dirty="0" err="1"/>
               <a:t>AddressBook</a:t>
             </a:r>
             <a:r>
-              <a:rPr lang="en-US" dirty="0" smtClean="0"/>
+              <a:rPr lang="en-US" dirty="0"/>
               <a:t> – Level 2</a:t>
             </a:r>
-            <a:endParaRPr lang="en-US" dirty="0"/>
           </a:p>
         </p:txBody>
       </p:sp>
@@ -3157,10 +3135,9 @@
           <a:lstStyle/>
           <a:p>
             <a:r>
-              <a:rPr lang="en-US" dirty="0" smtClean="0"/>
+              <a:rPr lang="en-US" dirty="0"/>
               <a:t>Diagrams</a:t>
             </a:r>
-            <a:endParaRPr lang="en-US" dirty="0"/>
           </a:p>
         </p:txBody>
       </p:sp>
@@ -3202,7 +3179,7 @@
         </p:nvSpPr>
         <p:spPr>
           <a:xfrm>
-            <a:off x="761999" y="5141640"/>
+            <a:off x="304799" y="5031200"/>
             <a:ext cx="929296" cy="346760"/>
           </a:xfrm>
           <a:prstGeom prst="rect">
@@ -3231,7 +3208,7 @@
           <a:p>
             <a:pPr algn="ctr"/>
             <a:r>
-              <a:rPr lang="en-US" sz="1050" dirty="0" err="1" smtClean="0"/>
+              <a:rPr lang="en-US" sz="1050" dirty="0" err="1"/>
               <a:t>TextUi</a:t>
             </a:r>
             <a:endParaRPr lang="en-SG" sz="1050" dirty="0"/>
@@ -3246,7 +3223,7 @@
         </p:nvSpPr>
         <p:spPr>
           <a:xfrm>
-            <a:off x="762000" y="3747060"/>
+            <a:off x="304800" y="3636620"/>
             <a:ext cx="929296" cy="346760"/>
           </a:xfrm>
           <a:prstGeom prst="rect">
@@ -3282,7 +3259,7 @@
           <a:p>
             <a:pPr algn="ctr"/>
             <a:r>
-              <a:rPr lang="en-US" sz="1050" dirty="0" smtClean="0">
+              <a:rPr lang="en-US" sz="1050" dirty="0">
                 <a:solidFill>
                   <a:schemeClr val="bg1"/>
                 </a:solidFill>
@@ -3305,7 +3282,7 @@
         </p:nvSpPr>
         <p:spPr>
           <a:xfrm>
-            <a:off x="2064848" y="3747060"/>
+            <a:off x="1607648" y="3636620"/>
             <a:ext cx="929296" cy="346760"/>
           </a:xfrm>
           <a:prstGeom prst="rect">
@@ -3349,7 +3326,7 @@
         </p:nvSpPr>
         <p:spPr>
           <a:xfrm>
-            <a:off x="1447800" y="3006040"/>
+            <a:off x="990600" y="2895600"/>
             <a:ext cx="634723" cy="346760"/>
           </a:xfrm>
           <a:prstGeom prst="rect">
@@ -3378,7 +3355,7 @@
           <a:p>
             <a:pPr algn="ctr"/>
             <a:r>
-              <a:rPr lang="en-US" sz="1050" dirty="0" smtClean="0"/>
+              <a:rPr lang="en-US" sz="1050" dirty="0"/>
               <a:t>Parser</a:t>
             </a:r>
             <a:endParaRPr lang="en-SG" sz="1050" dirty="0"/>
@@ -3393,7 +3370,7 @@
         </p:nvSpPr>
         <p:spPr>
           <a:xfrm>
-            <a:off x="3681046" y="3032560"/>
+            <a:off x="3223846" y="2922120"/>
             <a:ext cx="929296" cy="346760"/>
           </a:xfrm>
           <a:prstGeom prst="rect">
@@ -3422,14 +3399,14 @@
           <a:p>
             <a:pPr algn="ctr"/>
             <a:r>
-              <a:rPr lang="en-US" sz="1050" dirty="0" smtClean="0"/>
+              <a:rPr lang="en-US" sz="1050" dirty="0"/>
               <a:t>Unique</a:t>
             </a:r>
             <a:br>
-              <a:rPr lang="en-US" sz="1050" dirty="0" smtClean="0"/>
+              <a:rPr lang="en-US" sz="1050" dirty="0"/>
             </a:br>
             <a:r>
-              <a:rPr lang="en-US" sz="1050" dirty="0" err="1" smtClean="0"/>
+              <a:rPr lang="en-US" sz="1050" dirty="0" err="1"/>
               <a:t>TagList</a:t>
             </a:r>
             <a:endParaRPr lang="en-SG" sz="1050" dirty="0"/>
@@ -3444,7 +3421,7 @@
         </p:nvSpPr>
         <p:spPr>
           <a:xfrm>
-            <a:off x="3654669" y="4352685"/>
+            <a:off x="3197469" y="4242245"/>
             <a:ext cx="929296" cy="346760"/>
           </a:xfrm>
           <a:prstGeom prst="rect">
@@ -3473,14 +3450,14 @@
           <a:p>
             <a:pPr algn="ctr"/>
             <a:r>
-              <a:rPr lang="en-US" sz="1050" dirty="0" smtClean="0"/>
+              <a:rPr lang="en-US" sz="1050" dirty="0"/>
               <a:t>Unique</a:t>
             </a:r>
             <a:br>
-              <a:rPr lang="en-US" sz="1050" dirty="0" smtClean="0"/>
+              <a:rPr lang="en-US" sz="1050" dirty="0"/>
             </a:br>
             <a:r>
-              <a:rPr lang="en-US" sz="1050" dirty="0" err="1" smtClean="0"/>
+              <a:rPr lang="en-US" sz="1050" dirty="0" err="1"/>
               <a:t>PersonList</a:t>
             </a:r>
             <a:endParaRPr lang="en-SG" sz="1050" dirty="0"/>
@@ -3495,7 +3472,7 @@
         </p:nvSpPr>
         <p:spPr>
           <a:xfrm>
-            <a:off x="5219458" y="4352685"/>
+            <a:off x="4762258" y="4242245"/>
             <a:ext cx="929296" cy="346760"/>
           </a:xfrm>
           <a:prstGeom prst="rect">
@@ -3524,7 +3501,7 @@
           <a:p>
             <a:pPr algn="ctr"/>
             <a:r>
-              <a:rPr lang="en-US" sz="1050" dirty="0" smtClean="0"/>
+              <a:rPr lang="en-US" sz="1050" dirty="0"/>
               <a:t>Person</a:t>
             </a:r>
             <a:endParaRPr lang="en-SG" sz="1050" dirty="0"/>
@@ -3539,7 +3516,7 @@
         </p:nvSpPr>
         <p:spPr>
           <a:xfrm>
-            <a:off x="6781800" y="4036277"/>
+            <a:off x="6324600" y="3925837"/>
             <a:ext cx="929296" cy="346760"/>
           </a:xfrm>
           <a:prstGeom prst="rect">
@@ -3568,7 +3545,7 @@
           <a:p>
             <a:pPr algn="ctr"/>
             <a:r>
-              <a:rPr lang="en-US" sz="1050" dirty="0" smtClean="0"/>
+              <a:rPr lang="en-US" sz="1050" dirty="0"/>
               <a:t>Phone</a:t>
             </a:r>
             <a:endParaRPr lang="en-SG" sz="1050" dirty="0"/>
@@ -3583,7 +3560,7 @@
         </p:nvSpPr>
         <p:spPr>
           <a:xfrm>
-            <a:off x="6796454" y="4495800"/>
+            <a:off x="6339254" y="4385360"/>
             <a:ext cx="929296" cy="346760"/>
           </a:xfrm>
           <a:prstGeom prst="rect">
@@ -3612,7 +3589,7 @@
           <a:p>
             <a:pPr algn="ctr"/>
             <a:r>
-              <a:rPr lang="en-US" sz="1050" dirty="0" smtClean="0"/>
+              <a:rPr lang="en-US" sz="1050" dirty="0"/>
               <a:t>Email</a:t>
             </a:r>
             <a:endParaRPr lang="en-SG" sz="1050" dirty="0"/>
@@ -3627,7 +3604,7 @@
         </p:nvSpPr>
         <p:spPr>
           <a:xfrm>
-            <a:off x="6796454" y="4953000"/>
+            <a:off x="6339254" y="4842560"/>
             <a:ext cx="929296" cy="346760"/>
           </a:xfrm>
           <a:prstGeom prst="rect">
@@ -3656,7 +3633,7 @@
           <a:p>
             <a:pPr algn="ctr"/>
             <a:r>
-              <a:rPr lang="en-US" sz="1050" dirty="0" smtClean="0"/>
+              <a:rPr lang="en-US" sz="1050" dirty="0"/>
               <a:t>Address</a:t>
             </a:r>
             <a:endParaRPr lang="en-SG" sz="1050" dirty="0"/>
@@ -3671,7 +3648,7 @@
         </p:nvSpPr>
         <p:spPr>
           <a:xfrm>
-            <a:off x="1153227" y="4460471"/>
+            <a:off x="696027" y="4350031"/>
             <a:ext cx="929296" cy="346760"/>
           </a:xfrm>
           <a:prstGeom prst="rect">
@@ -3700,7 +3677,7 @@
           <a:p>
             <a:pPr algn="ctr"/>
             <a:r>
-              <a:rPr lang="en-US" sz="1050" dirty="0" err="1" smtClean="0"/>
+              <a:rPr lang="en-US" sz="1050" dirty="0" err="1"/>
               <a:t>StorageFile</a:t>
             </a:r>
             <a:endParaRPr lang="en-SG" sz="1050" dirty="0"/>
@@ -3715,7 +3692,7 @@
         </p:nvCxnSpPr>
         <p:spPr>
           <a:xfrm rot="5400000">
-            <a:off x="321738" y="4617731"/>
+            <a:off x="-135462" y="4507291"/>
             <a:ext cx="1047820" cy="1"/>
           </a:xfrm>
           <a:prstGeom prst="bentConnector3">
@@ -3758,7 +3735,7 @@
         </p:nvCxnSpPr>
         <p:spPr>
           <a:xfrm rot="5400000" flipH="1" flipV="1">
-            <a:off x="1053404" y="3352664"/>
+            <a:off x="596204" y="3242224"/>
             <a:ext cx="567640" cy="221152"/>
           </a:xfrm>
           <a:prstGeom prst="bentConnector2">
@@ -3797,7 +3774,7 @@
         </p:nvCxnSpPr>
         <p:spPr>
           <a:xfrm rot="16200000" flipH="1">
-            <a:off x="809847" y="4297627"/>
+            <a:off x="352647" y="4187187"/>
             <a:ext cx="530702" cy="141745"/>
           </a:xfrm>
           <a:prstGeom prst="bentConnector2">
@@ -3838,7 +3815,7 @@
         </p:nvCxnSpPr>
         <p:spPr>
           <a:xfrm flipV="1">
-            <a:off x="3230192" y="3205940"/>
+            <a:off x="2772992" y="3095500"/>
             <a:ext cx="450854" cy="712546"/>
           </a:xfrm>
           <a:prstGeom prst="bentConnector3">
@@ -3876,7 +3853,7 @@
         </p:nvCxnSpPr>
         <p:spPr>
           <a:xfrm>
-            <a:off x="3230192" y="3918486"/>
+            <a:off x="2772992" y="3808046"/>
             <a:ext cx="424477" cy="607579"/>
           </a:xfrm>
           <a:prstGeom prst="bentConnector3">
@@ -3916,7 +3893,7 @@
         </p:nvCxnSpPr>
         <p:spPr>
           <a:xfrm rot="5400000" flipH="1" flipV="1">
-            <a:off x="5197424" y="3866003"/>
+            <a:off x="4740224" y="3755563"/>
             <a:ext cx="973365" cy="12700"/>
           </a:xfrm>
           <a:prstGeom prst="bentConnector3">
@@ -3956,7 +3933,7 @@
         </p:nvCxnSpPr>
         <p:spPr>
           <a:xfrm flipV="1">
-            <a:off x="6384802" y="4209657"/>
+            <a:off x="5927602" y="4099217"/>
             <a:ext cx="396998" cy="312434"/>
           </a:xfrm>
           <a:prstGeom prst="bentConnector3">
@@ -3996,7 +3973,7 @@
         </p:nvCxnSpPr>
         <p:spPr>
           <a:xfrm>
-            <a:off x="6384802" y="4522091"/>
+            <a:off x="5927602" y="4411651"/>
             <a:ext cx="411652" cy="147089"/>
           </a:xfrm>
           <a:prstGeom prst="bentConnector3">
@@ -4036,7 +4013,7 @@
         </p:nvCxnSpPr>
         <p:spPr>
           <a:xfrm>
-            <a:off x="6384802" y="4522091"/>
+            <a:off x="5927602" y="4411651"/>
             <a:ext cx="411652" cy="604289"/>
           </a:xfrm>
           <a:prstGeom prst="bentConnector3">
@@ -4073,7 +4050,7 @@
         </p:nvSpPr>
         <p:spPr>
           <a:xfrm>
-            <a:off x="5219458" y="3032560"/>
+            <a:off x="4762258" y="2922120"/>
             <a:ext cx="929296" cy="346760"/>
           </a:xfrm>
           <a:prstGeom prst="rect">
@@ -4117,7 +4094,7 @@
         </p:nvSpPr>
         <p:spPr>
           <a:xfrm>
-            <a:off x="6148754" y="4435401"/>
+            <a:off x="5691554" y="4324961"/>
             <a:ext cx="236048" cy="173380"/>
           </a:xfrm>
           <a:prstGeom prst="flowChartDecision">
@@ -4164,7 +4141,7 @@
         </p:nvSpPr>
         <p:spPr>
           <a:xfrm>
-            <a:off x="4610342" y="3131950"/>
+            <a:off x="4153142" y="3021510"/>
             <a:ext cx="236048" cy="173380"/>
           </a:xfrm>
           <a:prstGeom prst="flowChartDecision">
@@ -4205,7 +4182,7 @@
         </p:nvSpPr>
         <p:spPr>
           <a:xfrm>
-            <a:off x="4573941" y="4439375"/>
+            <a:off x="4116741" y="4328935"/>
             <a:ext cx="236048" cy="173380"/>
           </a:xfrm>
           <a:prstGeom prst="flowChartDecision">
@@ -4246,7 +4223,7 @@
         </p:nvSpPr>
         <p:spPr>
           <a:xfrm>
-            <a:off x="2994144" y="3831796"/>
+            <a:off x="2536944" y="3721356"/>
             <a:ext cx="236048" cy="173380"/>
           </a:xfrm>
           <a:prstGeom prst="flowChartDecision">
@@ -4292,7 +4269,7 @@
         </p:nvCxnSpPr>
         <p:spPr>
           <a:xfrm flipV="1">
-            <a:off x="4846390" y="3205940"/>
+            <a:off x="4389190" y="3095500"/>
             <a:ext cx="373068" cy="12700"/>
           </a:xfrm>
           <a:prstGeom prst="straightConnector1">
@@ -4330,7 +4307,7 @@
         </p:nvCxnSpPr>
         <p:spPr>
           <a:xfrm>
-            <a:off x="4809989" y="4526065"/>
+            <a:off x="4352789" y="4415625"/>
             <a:ext cx="409469" cy="0"/>
           </a:xfrm>
           <a:prstGeom prst="straightConnector1">
@@ -4368,7 +4345,7 @@
         </p:nvCxnSpPr>
         <p:spPr>
           <a:xfrm>
-            <a:off x="1691296" y="3920440"/>
+            <a:off x="1234096" y="3810000"/>
             <a:ext cx="373552" cy="0"/>
           </a:xfrm>
           <a:prstGeom prst="straightConnector1">
@@ -4406,7 +4383,7 @@
         </p:nvSpPr>
         <p:spPr>
           <a:xfrm>
-            <a:off x="2258278" y="5140408"/>
+            <a:off x="1801078" y="5029968"/>
             <a:ext cx="1408598" cy="346760"/>
           </a:xfrm>
           <a:prstGeom prst="rect">
@@ -4435,14 +4412,14 @@
           <a:p>
             <a:pPr algn="ctr"/>
             <a:r>
-              <a:rPr lang="en-US" sz="1050" dirty="0" smtClean="0"/>
+              <a:rPr lang="en-US" sz="1050" dirty="0"/>
               <a:t>&lt;&lt;interface&gt;&gt;</a:t>
             </a:r>
           </a:p>
           <a:p>
             <a:pPr algn="ctr"/>
             <a:r>
-              <a:rPr lang="en-US" sz="1050" dirty="0" err="1" smtClean="0"/>
+              <a:rPr lang="en-US" sz="1050" dirty="0" err="1"/>
               <a:t>ReadOnlyPerson</a:t>
             </a:r>
             <a:endParaRPr lang="en-SG" sz="1050" dirty="0"/>
@@ -4460,7 +4437,7 @@
         </p:nvCxnSpPr>
         <p:spPr>
           <a:xfrm flipV="1">
-            <a:off x="1691295" y="5313788"/>
+            <a:off x="1234095" y="5203348"/>
             <a:ext cx="566983" cy="1232"/>
           </a:xfrm>
           <a:prstGeom prst="bentConnector3">
@@ -4501,7 +4478,7 @@
         </p:nvSpPr>
         <p:spPr>
           <a:xfrm rot="16200000">
-            <a:off x="3619386" y="5226026"/>
+            <a:off x="3162186" y="5115586"/>
             <a:ext cx="270504" cy="175523"/>
           </a:xfrm>
           <a:prstGeom prst="triangle">
@@ -4544,7 +4521,7 @@
         </p:nvCxnSpPr>
         <p:spPr>
           <a:xfrm rot="5400000">
-            <a:off x="4456082" y="4085763"/>
+            <a:off x="3998882" y="3975323"/>
             <a:ext cx="614343" cy="1841706"/>
           </a:xfrm>
           <a:prstGeom prst="bentConnector2">
@@ -4580,7 +4557,7 @@
         </p:nvSpPr>
         <p:spPr>
           <a:xfrm>
-            <a:off x="2566828" y="1356188"/>
+            <a:off x="2109628" y="1245748"/>
             <a:ext cx="1611867" cy="444640"/>
           </a:xfrm>
           <a:prstGeom prst="rect">
@@ -4609,7 +4586,7 @@
           <a:p>
             <a:pPr algn="ctr"/>
             <a:r>
-              <a:rPr lang="en-US" sz="1050" dirty="0" smtClean="0"/>
+              <a:rPr lang="en-US" sz="1050" dirty="0"/>
               <a:t>Command</a:t>
             </a:r>
             <a:endParaRPr lang="en-SG" sz="1050" dirty="0"/>
@@ -4624,7 +4601,7 @@
         </p:nvSpPr>
         <p:spPr>
           <a:xfrm flipH="1">
-            <a:off x="4724400" y="1059080"/>
+            <a:off x="4267200" y="948640"/>
             <a:ext cx="1404109" cy="346760"/>
           </a:xfrm>
           <a:prstGeom prst="rect">
@@ -4668,7 +4645,7 @@
         </p:nvSpPr>
         <p:spPr>
           <a:xfrm flipH="1">
-            <a:off x="4724400" y="1454067"/>
+            <a:off x="4267200" y="1343627"/>
             <a:ext cx="1404109" cy="346760"/>
           </a:xfrm>
           <a:prstGeom prst="rect">
@@ -4712,7 +4689,7 @@
         </p:nvSpPr>
         <p:spPr>
           <a:xfrm flipH="1">
-            <a:off x="4724400" y="1849054"/>
+            <a:off x="4267200" y="1738614"/>
             <a:ext cx="1404109" cy="346760"/>
           </a:xfrm>
           <a:prstGeom prst="rect">
@@ -4756,7 +4733,7 @@
         </p:nvSpPr>
         <p:spPr>
           <a:xfrm rot="16200000">
-            <a:off x="4131203" y="1571491"/>
+            <a:off x="3674003" y="1461051"/>
             <a:ext cx="270504" cy="175523"/>
           </a:xfrm>
           <a:prstGeom prst="triangle">
@@ -4799,7 +4776,7 @@
         </p:nvCxnSpPr>
         <p:spPr>
           <a:xfrm flipV="1">
-            <a:off x="4354217" y="1627447"/>
+            <a:off x="3897017" y="1517007"/>
             <a:ext cx="370183" cy="31806"/>
           </a:xfrm>
           <a:prstGeom prst="bentConnector3">
@@ -4837,7 +4814,7 @@
         </p:nvCxnSpPr>
         <p:spPr>
           <a:xfrm flipV="1">
-            <a:off x="4354217" y="1232460"/>
+            <a:off x="3897017" y="1122020"/>
             <a:ext cx="370183" cy="426793"/>
           </a:xfrm>
           <a:prstGeom prst="bentConnector3">
@@ -4875,7 +4852,7 @@
         </p:nvCxnSpPr>
         <p:spPr>
           <a:xfrm>
-            <a:off x="4354217" y="1659253"/>
+            <a:off x="3897017" y="1548813"/>
             <a:ext cx="370183" cy="363181"/>
           </a:xfrm>
           <a:prstGeom prst="bentConnector3">
@@ -4910,7 +4887,7 @@
         </p:nvSpPr>
         <p:spPr>
           <a:xfrm flipH="1">
-            <a:off x="4724400" y="2244040"/>
+            <a:off x="4267200" y="2133600"/>
             <a:ext cx="1404109" cy="346760"/>
           </a:xfrm>
           <a:prstGeom prst="rect">
@@ -4939,7 +4916,7 @@
           <a:p>
             <a:pPr algn="ctr"/>
             <a:r>
-              <a:rPr lang="en-US" sz="1050" dirty="0" smtClean="0"/>
+              <a:rPr lang="en-US" sz="1050" dirty="0"/>
               <a:t>…Command</a:t>
             </a:r>
             <a:endParaRPr lang="en-SG" sz="1050" dirty="0"/>
@@ -4957,7 +4934,7 @@
         </p:nvCxnSpPr>
         <p:spPr>
           <a:xfrm>
-            <a:off x="4354217" y="1659253"/>
+            <a:off x="3897017" y="1548813"/>
             <a:ext cx="370183" cy="758167"/>
           </a:xfrm>
           <a:prstGeom prst="bentConnector3">
@@ -4995,7 +4972,7 @@
         </p:nvCxnSpPr>
         <p:spPr>
           <a:xfrm rot="5400000" flipH="1" flipV="1">
-            <a:off x="1452229" y="1891441"/>
+            <a:off x="995029" y="1781001"/>
             <a:ext cx="1427532" cy="801666"/>
           </a:xfrm>
           <a:prstGeom prst="bentConnector2">
@@ -5031,7 +5008,7 @@
         </p:nvCxnSpPr>
         <p:spPr>
           <a:xfrm rot="5400000" flipH="1" flipV="1">
-            <a:off x="632132" y="1812364"/>
+            <a:off x="174932" y="1701924"/>
             <a:ext cx="2293164" cy="1576229"/>
           </a:xfrm>
           <a:prstGeom prst="bentConnector3">
@@ -5072,7 +5049,7 @@
         </p:nvCxnSpPr>
         <p:spPr>
           <a:xfrm rot="5400000">
-            <a:off x="1795164" y="2790743"/>
+            <a:off x="1337964" y="2680303"/>
             <a:ext cx="1889726" cy="6348"/>
           </a:xfrm>
           <a:prstGeom prst="bentConnector3">
@@ -5113,7 +5090,7 @@
         </p:nvSpPr>
         <p:spPr>
           <a:xfrm flipH="1">
-            <a:off x="1219200" y="720040"/>
+            <a:off x="762000" y="609600"/>
             <a:ext cx="1404109" cy="346760"/>
           </a:xfrm>
           <a:prstGeom prst="rect">
@@ -5160,7 +5137,7 @@
         </p:nvCxnSpPr>
         <p:spPr>
           <a:xfrm rot="16200000" flipV="1">
-            <a:off x="2766652" y="750077"/>
+            <a:off x="2309452" y="639637"/>
             <a:ext cx="462768" cy="749453"/>
           </a:xfrm>
           <a:prstGeom prst="bentConnector2">
@@ -5201,7 +5178,7 @@
         </p:nvCxnSpPr>
         <p:spPr>
           <a:xfrm rot="5400000" flipH="1" flipV="1">
-            <a:off x="-394396" y="2133468"/>
+            <a:off x="-851596" y="2023028"/>
             <a:ext cx="2853643" cy="373549"/>
           </a:xfrm>
           <a:prstGeom prst="bentConnector2">
@@ -5240,7 +5217,7 @@
         </p:nvSpPr>
         <p:spPr>
           <a:xfrm>
-            <a:off x="6781800" y="3539440"/>
+            <a:off x="6324600" y="3429000"/>
             <a:ext cx="929296" cy="346760"/>
           </a:xfrm>
           <a:prstGeom prst="rect">
@@ -5287,7 +5264,7 @@
         </p:nvCxnSpPr>
         <p:spPr>
           <a:xfrm flipV="1">
-            <a:off x="6384802" y="3712820"/>
+            <a:off x="5927602" y="3602380"/>
             <a:ext cx="396998" cy="809271"/>
           </a:xfrm>
           <a:prstGeom prst="bentConnector3">
@@ -5324,7 +5301,7 @@
         </p:nvSpPr>
         <p:spPr>
           <a:xfrm>
-            <a:off x="6384802" y="874142"/>
+            <a:off x="5927602" y="763702"/>
             <a:ext cx="929296" cy="346760"/>
           </a:xfrm>
           <a:prstGeom prst="rect">
@@ -5353,7 +5330,7 @@
           <a:p>
             <a:pPr algn="ctr"/>
             <a:r>
-              <a:rPr lang="en-US" sz="1050" dirty="0" smtClean="0"/>
+              <a:rPr lang="en-US" sz="1050" dirty="0"/>
               <a:t>Messages</a:t>
             </a:r>
             <a:endParaRPr lang="en-SG" sz="1050" dirty="0"/>
@@ -5368,7 +5345,7 @@
         </p:nvSpPr>
         <p:spPr>
           <a:xfrm>
-            <a:off x="7592520" y="874142"/>
+            <a:off x="7135320" y="763702"/>
             <a:ext cx="929296" cy="346760"/>
           </a:xfrm>
           <a:prstGeom prst="rect">
@@ -5397,7 +5374,7 @@
           <a:p>
             <a:pPr algn="ctr"/>
             <a:r>
-              <a:rPr lang="en-US" sz="1050" dirty="0" err="1" smtClean="0"/>
+              <a:rPr lang="en-US" sz="1050" dirty="0" err="1"/>
               <a:t>Utils</a:t>
             </a:r>
             <a:endParaRPr lang="en-SG" sz="1050" dirty="0"/>
@@ -5412,7 +5389,7 @@
         </p:nvSpPr>
         <p:spPr>
           <a:xfrm>
-            <a:off x="3666876" y="3710497"/>
+            <a:off x="3209676" y="3600057"/>
             <a:ext cx="929296" cy="346760"/>
           </a:xfrm>
           <a:prstGeom prst="rect">
@@ -5456,7 +5433,7 @@
         </p:nvSpPr>
         <p:spPr>
           <a:xfrm>
-            <a:off x="2356763" y="4455640"/>
+            <a:off x="1899563" y="4345200"/>
             <a:ext cx="929296" cy="346760"/>
           </a:xfrm>
           <a:prstGeom prst="rect">
@@ -5485,7 +5462,7 @@
           <a:p>
             <a:pPr algn="ctr"/>
             <a:r>
-              <a:rPr lang="en-US" sz="1050" dirty="0" smtClean="0"/>
+              <a:rPr lang="en-US" sz="1050" dirty="0"/>
               <a:t>Adapted…</a:t>
             </a:r>
             <a:endParaRPr lang="en-SG" sz="1050" dirty="0"/>
@@ -5503,7 +5480,7 @@
         </p:nvCxnSpPr>
         <p:spPr>
           <a:xfrm flipV="1">
-            <a:off x="2082523" y="4629020"/>
+            <a:off x="1625323" y="4518580"/>
             <a:ext cx="274240" cy="4831"/>
           </a:xfrm>
           <a:prstGeom prst="bentConnector3">
@@ -5544,7 +5521,7 @@
         </p:nvCxnSpPr>
         <p:spPr>
           <a:xfrm flipV="1">
-            <a:off x="6689603" y="1199445"/>
+            <a:off x="6232403" y="1089005"/>
             <a:ext cx="0" cy="304800"/>
           </a:xfrm>
           <a:prstGeom prst="straightConnector1">
@@ -5583,7 +5560,7 @@
         </p:nvCxnSpPr>
         <p:spPr>
           <a:xfrm flipV="1">
-            <a:off x="6842003" y="1199445"/>
+            <a:off x="6384803" y="1089005"/>
             <a:ext cx="0" cy="304800"/>
           </a:xfrm>
           <a:prstGeom prst="straightConnector1">
@@ -5622,7 +5599,7 @@
         </p:nvCxnSpPr>
         <p:spPr>
           <a:xfrm flipV="1">
-            <a:off x="6994403" y="1199445"/>
+            <a:off x="6537203" y="1089005"/>
             <a:ext cx="0" cy="304800"/>
           </a:xfrm>
           <a:prstGeom prst="straightConnector1">
@@ -5661,7 +5638,7 @@
         </p:nvCxnSpPr>
         <p:spPr>
           <a:xfrm flipV="1">
-            <a:off x="7864446" y="1199445"/>
+            <a:off x="7407246" y="1089005"/>
             <a:ext cx="0" cy="304800"/>
           </a:xfrm>
           <a:prstGeom prst="straightConnector1">
@@ -5700,7 +5677,7 @@
         </p:nvCxnSpPr>
         <p:spPr>
           <a:xfrm flipV="1">
-            <a:off x="8016846" y="1199445"/>
+            <a:off x="7559646" y="1089005"/>
             <a:ext cx="0" cy="304800"/>
           </a:xfrm>
           <a:prstGeom prst="straightConnector1">
@@ -5739,7 +5716,7 @@
         </p:nvCxnSpPr>
         <p:spPr>
           <a:xfrm flipV="1">
-            <a:off x="8169246" y="1199445"/>
+            <a:off x="7712046" y="1089005"/>
             <a:ext cx="0" cy="304800"/>
           </a:xfrm>
           <a:prstGeom prst="straightConnector1">
@@ -5764,6 +5741,439 @@
           </a:fillRef>
           <a:effectRef idx="1">
             <a:schemeClr val="accent2"/>
+          </a:effectRef>
+          <a:fontRef idx="minor">
+            <a:schemeClr val="dk1"/>
+          </a:fontRef>
+        </p:style>
+      </p:cxnSp>
+      <p:sp>
+        <p:nvSpPr>
+          <p:cNvPr id="63" name="Rectangle 21">
+            <a:extLst>
+              <a:ext uri="{FF2B5EF4-FFF2-40B4-BE49-F238E27FC236}">
+                <a16:creationId xmlns:a16="http://schemas.microsoft.com/office/drawing/2014/main" id="{D5AF3B5A-ADAF-429A-A300-69BAC784D492}"/>
+              </a:ext>
+            </a:extLst>
+          </p:cNvPr>
+          <p:cNvSpPr/>
+          <p:nvPr/>
+        </p:nvSpPr>
+        <p:spPr>
+          <a:xfrm>
+            <a:off x="7916249" y="5499746"/>
+            <a:ext cx="929296" cy="346760"/>
+          </a:xfrm>
+          <a:prstGeom prst="rect">
+            <a:avLst/>
+          </a:prstGeom>
+          <a:ln w="19050"/>
+          <a:effectLst/>
+        </p:spPr>
+        <p:style>
+          <a:lnRef idx="1">
+            <a:schemeClr val="accent4"/>
+          </a:lnRef>
+          <a:fillRef idx="2">
+            <a:schemeClr val="accent4"/>
+          </a:fillRef>
+          <a:effectRef idx="1">
+            <a:schemeClr val="accent4"/>
+          </a:effectRef>
+          <a:fontRef idx="minor">
+            <a:schemeClr val="dk1"/>
+          </a:fontRef>
+        </p:style>
+        <p:txBody>
+          <a:bodyPr rtlCol="0" anchor="ctr"/>
+          <a:lstStyle/>
+          <a:p>
+            <a:pPr algn="ctr"/>
+            <a:r>
+              <a:rPr lang="en-US" sz="1050" dirty="0"/>
+              <a:t>Unit</a:t>
+            </a:r>
+            <a:endParaRPr lang="en-SG" sz="1050" dirty="0"/>
+          </a:p>
+        </p:txBody>
+      </p:sp>
+      <p:cxnSp>
+        <p:nvCxnSpPr>
+          <p:cNvPr id="64" name="Elbow Connector 70">
+            <a:extLst>
+              <a:ext uri="{FF2B5EF4-FFF2-40B4-BE49-F238E27FC236}">
+                <a16:creationId xmlns:a16="http://schemas.microsoft.com/office/drawing/2014/main" id="{C9D42F03-0DC5-4735-AE2A-7BD307176799}"/>
+              </a:ext>
+            </a:extLst>
+          </p:cNvPr>
+          <p:cNvCxnSpPr>
+            <a:stCxn id="66" idx="3"/>
+            <a:endCxn id="63" idx="1"/>
+          </p:cNvCxnSpPr>
+          <p:nvPr/>
+        </p:nvCxnSpPr>
+        <p:spPr>
+          <a:xfrm>
+            <a:off x="7504597" y="5068837"/>
+            <a:ext cx="411652" cy="604289"/>
+          </a:xfrm>
+          <a:prstGeom prst="bentConnector3">
+            <a:avLst>
+              <a:gd name="adj1" fmla="val 50000"/>
+            </a:avLst>
+          </a:prstGeom>
+          <a:ln w="19050">
+            <a:headEnd type="none" w="med" len="med"/>
+            <a:tailEnd type="arrow" w="med" len="med"/>
+          </a:ln>
+          <a:effectLst/>
+        </p:spPr>
+        <p:style>
+          <a:lnRef idx="1">
+            <a:schemeClr val="accent4"/>
+          </a:lnRef>
+          <a:fillRef idx="2">
+            <a:schemeClr val="accent4"/>
+          </a:fillRef>
+          <a:effectRef idx="1">
+            <a:schemeClr val="accent4"/>
+          </a:effectRef>
+          <a:fontRef idx="minor">
+            <a:schemeClr val="dk1"/>
+          </a:fontRef>
+        </p:style>
+      </p:cxnSp>
+      <p:sp>
+        <p:nvSpPr>
+          <p:cNvPr id="66" name="Flowchart: Decision 89">
+            <a:extLst>
+              <a:ext uri="{FF2B5EF4-FFF2-40B4-BE49-F238E27FC236}">
+                <a16:creationId xmlns:a16="http://schemas.microsoft.com/office/drawing/2014/main" id="{5625BD07-18ED-43F9-A3E6-45181E57B399}"/>
+              </a:ext>
+            </a:extLst>
+          </p:cNvPr>
+          <p:cNvSpPr/>
+          <p:nvPr/>
+        </p:nvSpPr>
+        <p:spPr>
+          <a:xfrm>
+            <a:off x="7268549" y="4982147"/>
+            <a:ext cx="236048" cy="173380"/>
+          </a:xfrm>
+          <a:prstGeom prst="flowChartDecision">
+            <a:avLst/>
+          </a:prstGeom>
+          <a:solidFill>
+            <a:schemeClr val="accent4"/>
+          </a:solidFill>
+          <a:ln w="19050"/>
+          <a:effectLst/>
+        </p:spPr>
+        <p:style>
+          <a:lnRef idx="1">
+            <a:schemeClr val="accent4"/>
+          </a:lnRef>
+          <a:fillRef idx="2">
+            <a:schemeClr val="accent4"/>
+          </a:fillRef>
+          <a:effectRef idx="1">
+            <a:schemeClr val="accent4"/>
+          </a:effectRef>
+          <a:fontRef idx="minor">
+            <a:schemeClr val="dk1"/>
+          </a:fontRef>
+        </p:style>
+        <p:txBody>
+          <a:bodyPr rtlCol="0" anchor="ctr"/>
+          <a:lstStyle/>
+          <a:p>
+            <a:pPr algn="ctr"/>
+            <a:endParaRPr lang="en-US" sz="1050"/>
+          </a:p>
+        </p:txBody>
+      </p:sp>
+      <p:sp>
+        <p:nvSpPr>
+          <p:cNvPr id="69" name="Rectangle 21">
+            <a:extLst>
+              <a:ext uri="{FF2B5EF4-FFF2-40B4-BE49-F238E27FC236}">
+                <a16:creationId xmlns:a16="http://schemas.microsoft.com/office/drawing/2014/main" id="{2D20002F-28E8-4CB6-BCE9-CA4FDFCB54CA}"/>
+              </a:ext>
+            </a:extLst>
+          </p:cNvPr>
+          <p:cNvSpPr/>
+          <p:nvPr/>
+        </p:nvSpPr>
+        <p:spPr>
+          <a:xfrm>
+            <a:off x="7916249" y="5998906"/>
+            <a:ext cx="929296" cy="346760"/>
+          </a:xfrm>
+          <a:prstGeom prst="rect">
+            <a:avLst/>
+          </a:prstGeom>
+          <a:ln w="19050"/>
+          <a:effectLst/>
+        </p:spPr>
+        <p:style>
+          <a:lnRef idx="1">
+            <a:schemeClr val="accent4"/>
+          </a:lnRef>
+          <a:fillRef idx="2">
+            <a:schemeClr val="accent4"/>
+          </a:fillRef>
+          <a:effectRef idx="1">
+            <a:schemeClr val="accent4"/>
+          </a:effectRef>
+          <a:fontRef idx="minor">
+            <a:schemeClr val="dk1"/>
+          </a:fontRef>
+        </p:style>
+        <p:txBody>
+          <a:bodyPr rtlCol="0" anchor="ctr"/>
+          <a:lstStyle/>
+          <a:p>
+            <a:pPr algn="ctr"/>
+            <a:r>
+              <a:rPr lang="en-US" sz="1050" dirty="0"/>
+              <a:t>Postal code</a:t>
+            </a:r>
+            <a:endParaRPr lang="en-SG" sz="1050" dirty="0"/>
+          </a:p>
+        </p:txBody>
+      </p:sp>
+      <p:sp>
+        <p:nvSpPr>
+          <p:cNvPr id="72" name="Rectangle 21">
+            <a:extLst>
+              <a:ext uri="{FF2B5EF4-FFF2-40B4-BE49-F238E27FC236}">
+                <a16:creationId xmlns:a16="http://schemas.microsoft.com/office/drawing/2014/main" id="{8E86FB05-8C92-4862-97F0-8852749CA2D5}"/>
+              </a:ext>
+            </a:extLst>
+          </p:cNvPr>
+          <p:cNvSpPr/>
+          <p:nvPr/>
+        </p:nvSpPr>
+        <p:spPr>
+          <a:xfrm>
+            <a:off x="7916249" y="4982147"/>
+            <a:ext cx="929296" cy="346760"/>
+          </a:xfrm>
+          <a:prstGeom prst="rect">
+            <a:avLst/>
+          </a:prstGeom>
+          <a:ln w="19050"/>
+          <a:effectLst/>
+        </p:spPr>
+        <p:style>
+          <a:lnRef idx="1">
+            <a:schemeClr val="accent4"/>
+          </a:lnRef>
+          <a:fillRef idx="2">
+            <a:schemeClr val="accent4"/>
+          </a:fillRef>
+          <a:effectRef idx="1">
+            <a:schemeClr val="accent4"/>
+          </a:effectRef>
+          <a:fontRef idx="minor">
+            <a:schemeClr val="dk1"/>
+          </a:fontRef>
+        </p:style>
+        <p:txBody>
+          <a:bodyPr rtlCol="0" anchor="ctr"/>
+          <a:lstStyle/>
+          <a:p>
+            <a:pPr algn="ctr"/>
+            <a:r>
+              <a:rPr lang="en-US" sz="1050" dirty="0"/>
+              <a:t>Street</a:t>
+            </a:r>
+            <a:endParaRPr lang="en-SG" sz="1050" dirty="0"/>
+          </a:p>
+        </p:txBody>
+      </p:sp>
+      <p:sp>
+        <p:nvSpPr>
+          <p:cNvPr id="74" name="Rectangle 21">
+            <a:extLst>
+              <a:ext uri="{FF2B5EF4-FFF2-40B4-BE49-F238E27FC236}">
+                <a16:creationId xmlns:a16="http://schemas.microsoft.com/office/drawing/2014/main" id="{05A63BDA-0570-4E6D-B512-592AF3379E0C}"/>
+              </a:ext>
+            </a:extLst>
+          </p:cNvPr>
+          <p:cNvSpPr/>
+          <p:nvPr/>
+        </p:nvSpPr>
+        <p:spPr>
+          <a:xfrm>
+            <a:off x="7916249" y="4438257"/>
+            <a:ext cx="929296" cy="346760"/>
+          </a:xfrm>
+          <a:prstGeom prst="rect">
+            <a:avLst/>
+          </a:prstGeom>
+          <a:ln w="19050"/>
+          <a:effectLst/>
+        </p:spPr>
+        <p:style>
+          <a:lnRef idx="1">
+            <a:schemeClr val="accent4"/>
+          </a:lnRef>
+          <a:fillRef idx="2">
+            <a:schemeClr val="accent4"/>
+          </a:fillRef>
+          <a:effectRef idx="1">
+            <a:schemeClr val="accent4"/>
+          </a:effectRef>
+          <a:fontRef idx="minor">
+            <a:schemeClr val="dk1"/>
+          </a:fontRef>
+        </p:style>
+        <p:txBody>
+          <a:bodyPr rtlCol="0" anchor="ctr"/>
+          <a:lstStyle/>
+          <a:p>
+            <a:pPr algn="ctr"/>
+            <a:r>
+              <a:rPr lang="en-US" sz="1050" dirty="0"/>
+              <a:t>Block</a:t>
+            </a:r>
+            <a:endParaRPr lang="en-SG" sz="1050" dirty="0"/>
+          </a:p>
+        </p:txBody>
+      </p:sp>
+      <p:cxnSp>
+        <p:nvCxnSpPr>
+          <p:cNvPr id="75" name="Elbow Connector 70">
+            <a:extLst>
+              <a:ext uri="{FF2B5EF4-FFF2-40B4-BE49-F238E27FC236}">
+                <a16:creationId xmlns:a16="http://schemas.microsoft.com/office/drawing/2014/main" id="{12BF0D76-D8D6-4767-B414-F6843F1B8853}"/>
+              </a:ext>
+            </a:extLst>
+          </p:cNvPr>
+          <p:cNvCxnSpPr>
+            <a:stCxn id="66" idx="3"/>
+            <a:endCxn id="74" idx="1"/>
+          </p:cNvCxnSpPr>
+          <p:nvPr/>
+        </p:nvCxnSpPr>
+        <p:spPr>
+          <a:xfrm flipV="1">
+            <a:off x="7504597" y="4611637"/>
+            <a:ext cx="411652" cy="457200"/>
+          </a:xfrm>
+          <a:prstGeom prst="bentConnector3">
+            <a:avLst>
+              <a:gd name="adj1" fmla="val 50000"/>
+            </a:avLst>
+          </a:prstGeom>
+          <a:ln w="19050">
+            <a:headEnd type="none" w="med" len="med"/>
+            <a:tailEnd type="arrow" w="med" len="med"/>
+          </a:ln>
+          <a:effectLst/>
+        </p:spPr>
+        <p:style>
+          <a:lnRef idx="1">
+            <a:schemeClr val="accent4"/>
+          </a:lnRef>
+          <a:fillRef idx="2">
+            <a:schemeClr val="accent4"/>
+          </a:fillRef>
+          <a:effectRef idx="1">
+            <a:schemeClr val="accent4"/>
+          </a:effectRef>
+          <a:fontRef idx="minor">
+            <a:schemeClr val="dk1"/>
+          </a:fontRef>
+        </p:style>
+      </p:cxnSp>
+      <p:cxnSp>
+        <p:nvCxnSpPr>
+          <p:cNvPr id="76" name="Elbow Connector 70">
+            <a:extLst>
+              <a:ext uri="{FF2B5EF4-FFF2-40B4-BE49-F238E27FC236}">
+                <a16:creationId xmlns:a16="http://schemas.microsoft.com/office/drawing/2014/main" id="{85AE24CE-5E88-45A5-9678-BFB3F6EE1FDD}"/>
+              </a:ext>
+            </a:extLst>
+          </p:cNvPr>
+          <p:cNvCxnSpPr>
+            <a:stCxn id="66" idx="3"/>
+            <a:endCxn id="69" idx="1"/>
+          </p:cNvCxnSpPr>
+          <p:nvPr/>
+        </p:nvCxnSpPr>
+        <p:spPr>
+          <a:xfrm>
+            <a:off x="7504597" y="5068837"/>
+            <a:ext cx="411652" cy="1103449"/>
+          </a:xfrm>
+          <a:prstGeom prst="bentConnector3">
+            <a:avLst>
+              <a:gd name="adj1" fmla="val 50000"/>
+            </a:avLst>
+          </a:prstGeom>
+          <a:ln w="19050">
+            <a:headEnd type="none" w="med" len="med"/>
+            <a:tailEnd type="arrow" w="med" len="med"/>
+          </a:ln>
+          <a:effectLst/>
+        </p:spPr>
+        <p:style>
+          <a:lnRef idx="1">
+            <a:schemeClr val="accent4"/>
+          </a:lnRef>
+          <a:fillRef idx="2">
+            <a:schemeClr val="accent4"/>
+          </a:fillRef>
+          <a:effectRef idx="1">
+            <a:schemeClr val="accent4"/>
+          </a:effectRef>
+          <a:fontRef idx="minor">
+            <a:schemeClr val="dk1"/>
+          </a:fontRef>
+        </p:style>
+      </p:cxnSp>
+      <p:cxnSp>
+        <p:nvCxnSpPr>
+          <p:cNvPr id="77" name="Elbow Connector 70">
+            <a:extLst>
+              <a:ext uri="{FF2B5EF4-FFF2-40B4-BE49-F238E27FC236}">
+                <a16:creationId xmlns:a16="http://schemas.microsoft.com/office/drawing/2014/main" id="{10D386DA-9300-43D5-929E-5311FD717394}"/>
+              </a:ext>
+            </a:extLst>
+          </p:cNvPr>
+          <p:cNvCxnSpPr>
+            <a:stCxn id="66" idx="3"/>
+            <a:endCxn id="72" idx="1"/>
+          </p:cNvCxnSpPr>
+          <p:nvPr/>
+        </p:nvCxnSpPr>
+        <p:spPr>
+          <a:xfrm>
+            <a:off x="7504597" y="5068837"/>
+            <a:ext cx="411652" cy="86690"/>
+          </a:xfrm>
+          <a:prstGeom prst="bentConnector3">
+            <a:avLst>
+              <a:gd name="adj1" fmla="val 50000"/>
+            </a:avLst>
+          </a:prstGeom>
+          <a:ln w="19050">
+            <a:headEnd type="none" w="med" len="med"/>
+            <a:tailEnd type="arrow" w="med" len="med"/>
+          </a:ln>
+          <a:effectLst/>
+        </p:spPr>
+        <p:style>
+          <a:lnRef idx="1">
+            <a:schemeClr val="accent4"/>
+          </a:lnRef>
+          <a:fillRef idx="2">
+            <a:schemeClr val="accent4"/>
+          </a:fillRef>
+          <a:effectRef idx="1">
+            <a:schemeClr val="accent4"/>
           </a:effectRef>
           <a:fontRef idx="minor">
             <a:schemeClr val="dk1"/>
@@ -5837,7 +6247,7 @@
           <a:p>
             <a:pPr algn="ctr"/>
             <a:r>
-              <a:rPr lang="en-US" sz="1050" dirty="0" smtClean="0"/>
+              <a:rPr lang="en-US" sz="1050" dirty="0"/>
               <a:t>Address</a:t>
             </a:r>
             <a:endParaRPr lang="en-SG" sz="1050" dirty="0"/>
@@ -5881,7 +6291,7 @@
           <a:p>
             <a:pPr algn="ctr"/>
             <a:r>
-              <a:rPr lang="en-US" sz="1050" dirty="0" smtClean="0"/>
+              <a:rPr lang="en-US" sz="1050" dirty="0"/>
               <a:t>Unit</a:t>
             </a:r>
             <a:endParaRPr lang="en-SG" sz="1050" dirty="0"/>
@@ -6008,7 +6418,7 @@
           <a:p>
             <a:pPr algn="ctr"/>
             <a:r>
-              <a:rPr lang="en-US" sz="1050" dirty="0" smtClean="0"/>
+              <a:rPr lang="en-US" sz="1050" dirty="0"/>
               <a:t>Postal code</a:t>
             </a:r>
             <a:endParaRPr lang="en-SG" sz="1050" dirty="0"/>
@@ -6052,7 +6462,7 @@
           <a:p>
             <a:pPr algn="ctr"/>
             <a:r>
-              <a:rPr lang="en-US" sz="1050" dirty="0" smtClean="0"/>
+              <a:rPr lang="en-US" sz="1050" dirty="0"/>
               <a:t>Street</a:t>
             </a:r>
             <a:endParaRPr lang="en-SG" sz="1050" dirty="0"/>
@@ -6096,7 +6506,7 @@
           <a:p>
             <a:pPr algn="ctr"/>
             <a:r>
-              <a:rPr lang="en-US" sz="1050" dirty="0" smtClean="0"/>
+              <a:rPr lang="en-US" sz="1050" dirty="0"/>
               <a:t>Block</a:t>
             </a:r>
             <a:endParaRPr lang="en-SG" sz="1050" dirty="0"/>
@@ -6260,10 +6670,9 @@
           <a:p>
             <a:pPr algn="ctr"/>
             <a:r>
-              <a:rPr lang="en-SG" sz="1050" dirty="0" smtClean="0"/>
+              <a:rPr lang="en-SG" sz="1050" dirty="0"/>
               <a:t>Contact</a:t>
             </a:r>
-            <a:endParaRPr lang="en-SG" sz="1050" dirty="0"/>
           </a:p>
         </p:txBody>
       </p:sp>
@@ -6304,7 +6713,7 @@
           <a:p>
             <a:pPr algn="ctr"/>
             <a:r>
-              <a:rPr lang="en-US" sz="1050" dirty="0" smtClean="0"/>
+              <a:rPr lang="en-US" sz="1050" dirty="0"/>
               <a:t>Phone</a:t>
             </a:r>
             <a:endParaRPr lang="en-SG" sz="1050" dirty="0"/>
@@ -6348,7 +6757,7 @@
           <a:p>
             <a:pPr algn="ctr"/>
             <a:r>
-              <a:rPr lang="en-US" sz="1050" dirty="0" smtClean="0"/>
+              <a:rPr lang="en-US" sz="1050" dirty="0"/>
               <a:t>Email</a:t>
             </a:r>
             <a:endParaRPr lang="en-SG" sz="1050" dirty="0"/>
@@ -6392,7 +6801,7 @@
           <a:p>
             <a:pPr algn="ctr"/>
             <a:r>
-              <a:rPr lang="en-US" sz="1050" dirty="0" smtClean="0"/>
+              <a:rPr lang="en-US" sz="1050" dirty="0"/>
               <a:t>Address</a:t>
             </a:r>
             <a:endParaRPr lang="en-SG" sz="1050" dirty="0"/>
@@ -6581,10 +6990,9 @@
           <a:p>
             <a:pPr algn="ctr"/>
             <a:r>
-              <a:rPr lang="en-SG" sz="1050" dirty="0" smtClean="0"/>
+              <a:rPr lang="en-SG" sz="1050" dirty="0"/>
               <a:t>&lt;&lt;interface&gt;&gt; Printable</a:t>
             </a:r>
-            <a:endParaRPr lang="en-SG" sz="1050" dirty="0"/>
           </a:p>
         </p:txBody>
       </p:sp>
@@ -6625,7 +7033,7 @@
           <a:p>
             <a:pPr algn="ctr"/>
             <a:r>
-              <a:rPr lang="en-US" sz="1050" dirty="0" smtClean="0"/>
+              <a:rPr lang="en-US" sz="1050" dirty="0"/>
               <a:t>Phone</a:t>
             </a:r>
             <a:endParaRPr lang="en-SG" sz="1050" dirty="0"/>
@@ -6669,7 +7077,7 @@
           <a:p>
             <a:pPr algn="ctr"/>
             <a:r>
-              <a:rPr lang="en-US" sz="1050" dirty="0" smtClean="0"/>
+              <a:rPr lang="en-US" sz="1050" dirty="0"/>
               <a:t>Email</a:t>
             </a:r>
             <a:endParaRPr lang="en-SG" sz="1050" dirty="0"/>
@@ -6713,7 +7121,7 @@
           <a:p>
             <a:pPr algn="ctr"/>
             <a:r>
-              <a:rPr lang="en-US" sz="1050" dirty="0" smtClean="0"/>
+              <a:rPr lang="en-US" sz="1050" dirty="0"/>
               <a:t>Address</a:t>
             </a:r>
             <a:endParaRPr lang="en-SG" sz="1050" dirty="0"/>
@@ -6914,7 +7322,7 @@
           <a:p>
             <a:pPr algn="ctr"/>
             <a:r>
-              <a:rPr lang="en-US" sz="1050" dirty="0" smtClean="0"/>
+              <a:rPr lang="en-US" sz="1050" dirty="0"/>
               <a:t>Name</a:t>
             </a:r>
             <a:endParaRPr lang="en-SG" sz="1050" dirty="0"/>
@@ -7037,15 +7445,15 @@
           <a:p>
             <a:pPr algn="ctr"/>
             <a:r>
-              <a:rPr lang="en-US" sz="1050" dirty="0" smtClean="0"/>
+              <a:rPr lang="en-US" sz="1050" dirty="0"/>
               <a:t>+ </a:t>
             </a:r>
             <a:r>
-              <a:rPr lang="en-US" sz="1050" dirty="0" err="1" smtClean="0"/>
+              <a:rPr lang="en-US" sz="1050" dirty="0" err="1"/>
               <a:t>getPrintableString</a:t>
             </a:r>
             <a:r>
-              <a:rPr lang="en-US" sz="1050" dirty="0" smtClean="0"/>
+              <a:rPr lang="en-US" sz="1050" dirty="0"/>
               <a:t>(): String</a:t>
             </a:r>
             <a:endParaRPr lang="en-SG" sz="1050" dirty="0"/>
@@ -7133,14 +7541,14 @@
           <a:p>
             <a:pPr algn="ctr"/>
             <a:r>
-              <a:rPr lang="en-US" sz="1050" dirty="0" smtClean="0"/>
+              <a:rPr lang="en-US" sz="1050" dirty="0"/>
               <a:t>Unique</a:t>
             </a:r>
             <a:br>
-              <a:rPr lang="en-US" sz="1050" dirty="0" smtClean="0"/>
+              <a:rPr lang="en-US" sz="1050" dirty="0"/>
             </a:br>
             <a:r>
-              <a:rPr lang="en-US" sz="1050" dirty="0" err="1" smtClean="0"/>
+              <a:rPr lang="en-US" sz="1050" dirty="0" err="1"/>
               <a:t>TagList</a:t>
             </a:r>
             <a:endParaRPr lang="en-SG" sz="1050" dirty="0"/>
@@ -7184,14 +7592,14 @@
           <a:p>
             <a:pPr algn="ctr"/>
             <a:r>
-              <a:rPr lang="en-US" sz="1050" dirty="0" smtClean="0"/>
+              <a:rPr lang="en-US" sz="1050" dirty="0"/>
               <a:t>Unique</a:t>
             </a:r>
             <a:br>
-              <a:rPr lang="en-US" sz="1050" dirty="0" smtClean="0"/>
+              <a:rPr lang="en-US" sz="1050" dirty="0"/>
             </a:br>
             <a:r>
-              <a:rPr lang="en-US" sz="1050" dirty="0" err="1" smtClean="0"/>
+              <a:rPr lang="en-US" sz="1050" dirty="0" err="1"/>
               <a:t>PersonList</a:t>
             </a:r>
             <a:endParaRPr lang="en-SG" sz="1050" dirty="0"/>
@@ -7235,7 +7643,7 @@
           <a:p>
             <a:pPr algn="ctr"/>
             <a:r>
-              <a:rPr lang="en-US" sz="1050" dirty="0" smtClean="0"/>
+              <a:rPr lang="en-US" sz="1050" dirty="0"/>
               <a:t>Person</a:t>
             </a:r>
             <a:endParaRPr lang="en-SG" sz="1050" dirty="0"/>
@@ -7602,7 +8010,7 @@
           <a:p>
             <a:pPr algn="ctr"/>
             <a:r>
-              <a:rPr lang="en-US" sz="1050" dirty="0" smtClean="0"/>
+              <a:rPr lang="en-US" sz="1050" dirty="0"/>
               <a:t>Tagging</a:t>
             </a:r>
             <a:endParaRPr lang="en-SG" sz="1050" dirty="0"/>
@@ -7746,7 +8154,7 @@
           <a:lstStyle/>
           <a:p>
             <a:r>
-              <a:rPr lang="en-US" dirty="0" smtClean="0">
+              <a:rPr lang="en-US" dirty="0">
                 <a:solidFill>
                   <a:schemeClr val="accent6">
                     <a:lumMod val="75000"/>
@@ -7755,13 +8163,6 @@
               </a:rPr>
               <a:t>*</a:t>
             </a:r>
-            <a:endParaRPr lang="en-US" dirty="0">
-              <a:solidFill>
-                <a:schemeClr val="accent6">
-                  <a:lumMod val="75000"/>
-                </a:schemeClr>
-              </a:solidFill>
-            </a:endParaRPr>
           </a:p>
         </p:txBody>
       </p:sp>
@@ -7788,7 +8189,7 @@
           <a:lstStyle/>
           <a:p>
             <a:r>
-              <a:rPr lang="en-US" sz="1100" dirty="0" err="1" smtClean="0">
+              <a:rPr lang="en-US" sz="1100" dirty="0" err="1">
                 <a:solidFill>
                   <a:schemeClr val="accent6">
                     <a:lumMod val="75000"/>
@@ -7918,14 +8319,14 @@
           <a:p>
             <a:pPr algn="ctr"/>
             <a:r>
-              <a:rPr lang="en-US" sz="1050" dirty="0" smtClean="0"/>
+              <a:rPr lang="en-US" sz="1050" dirty="0"/>
               <a:t>Unique</a:t>
             </a:r>
             <a:br>
-              <a:rPr lang="en-US" sz="1050" dirty="0" smtClean="0"/>
+              <a:rPr lang="en-US" sz="1050" dirty="0"/>
             </a:br>
             <a:r>
-              <a:rPr lang="en-US" sz="1050" dirty="0" err="1" smtClean="0"/>
+              <a:rPr lang="en-US" sz="1050" dirty="0" err="1"/>
               <a:t>TagList</a:t>
             </a:r>
             <a:endParaRPr lang="en-SG" sz="1050" dirty="0"/>
@@ -7969,14 +8370,14 @@
           <a:p>
             <a:pPr algn="ctr"/>
             <a:r>
-              <a:rPr lang="en-US" sz="1050" dirty="0" smtClean="0"/>
+              <a:rPr lang="en-US" sz="1050" dirty="0"/>
               <a:t>Unique</a:t>
             </a:r>
             <a:br>
-              <a:rPr lang="en-US" sz="1050" dirty="0" smtClean="0"/>
+              <a:rPr lang="en-US" sz="1050" dirty="0"/>
             </a:br>
             <a:r>
-              <a:rPr lang="en-US" sz="1050" dirty="0" err="1" smtClean="0"/>
+              <a:rPr lang="en-US" sz="1050" dirty="0" err="1"/>
               <a:t>PersonList</a:t>
             </a:r>
             <a:endParaRPr lang="en-SG" sz="1050" dirty="0"/>
@@ -8020,7 +8421,7 @@
           <a:p>
             <a:pPr algn="ctr"/>
             <a:r>
-              <a:rPr lang="en-US" sz="1050" dirty="0" smtClean="0"/>
+              <a:rPr lang="en-US" sz="1050" dirty="0"/>
               <a:t>Person</a:t>
             </a:r>
             <a:endParaRPr lang="en-SG" sz="1050" dirty="0"/>
@@ -8387,7 +8788,7 @@
           <a:p>
             <a:pPr algn="ctr"/>
             <a:r>
-              <a:rPr lang="en-US" sz="1050" dirty="0" smtClean="0"/>
+              <a:rPr lang="en-US" sz="1050" dirty="0"/>
               <a:t>Tagging</a:t>
             </a:r>
             <a:endParaRPr lang="en-SG" sz="1050" dirty="0"/>
@@ -8493,7 +8894,7 @@
           <a:lstStyle/>
           <a:p>
             <a:r>
-              <a:rPr lang="en-US" dirty="0" smtClean="0">
+              <a:rPr lang="en-US" dirty="0">
                 <a:solidFill>
                   <a:schemeClr val="accent6">
                     <a:lumMod val="75000"/>
@@ -8502,13 +8903,6 @@
               </a:rPr>
               <a:t>*</a:t>
             </a:r>
-            <a:endParaRPr lang="en-US" dirty="0">
-              <a:solidFill>
-                <a:schemeClr val="accent6">
-                  <a:lumMod val="75000"/>
-                </a:schemeClr>
-              </a:solidFill>
-            </a:endParaRPr>
           </a:p>
         </p:txBody>
       </p:sp>
@@ -8617,7 +9011,7 @@
           <a:lstStyle/>
           <a:p>
             <a:r>
-              <a:rPr lang="en-US" sz="1100" dirty="0" err="1" smtClean="0">
+              <a:rPr lang="en-US" sz="1100" dirty="0" err="1">
                 <a:solidFill>
                   <a:schemeClr val="accent6">
                     <a:lumMod val="75000"/>

</xml_diff>